<commit_message>
Add Scientific document and change powerpoint
</commit_message>
<xml_diff>
--- a/P_POINT_SO.pptx
+++ b/P_POINT_SO.pptx
@@ -7605,7 +7605,7 @@
             <a:pPr lvl="1"/>
             <a:r>
               <a:rPr lang="pt-PT" dirty="0"/>
-              <a:t>Gap </a:t>
+              <a:t>Gap - </a:t>
             </a:r>
             <a:r>
               <a:rPr lang="pt-PT" dirty="0" err="1"/>
@@ -7628,7 +7628,7 @@
             <a:pPr lvl="1"/>
             <a:r>
               <a:rPr lang="pt-PT" dirty="0"/>
-              <a:t>Time </a:t>
+              <a:t>Time - </a:t>
             </a:r>
             <a:r>
               <a:rPr lang="pt-PT" dirty="0" err="1"/>
@@ -7661,7 +7661,7 @@
             <a:pPr lvl="1"/>
             <a:r>
               <a:rPr lang="pt-PT" dirty="0"/>
-              <a:t>Gap </a:t>
+              <a:t>Gap - </a:t>
             </a:r>
             <a:r>
               <a:rPr lang="pt-PT" dirty="0" err="1"/>
@@ -7684,7 +7684,7 @@
             <a:pPr lvl="1"/>
             <a:r>
               <a:rPr lang="pt-PT" dirty="0"/>
-              <a:t>Time </a:t>
+              <a:t>Time - </a:t>
             </a:r>
             <a:r>
               <a:rPr lang="pt-PT" dirty="0" err="1"/>
@@ -7737,7 +7737,7 @@
             <a:pPr lvl="1"/>
             <a:r>
               <a:rPr lang="pt-PT" dirty="0"/>
-              <a:t>Gap </a:t>
+              <a:t>Gap - </a:t>
             </a:r>
             <a:r>
               <a:rPr lang="pt-PT" dirty="0" err="1"/>
@@ -7760,7 +7760,7 @@
             <a:pPr lvl="1"/>
             <a:r>
               <a:rPr lang="pt-PT" dirty="0"/>
-              <a:t>Time </a:t>
+              <a:t>Time - </a:t>
             </a:r>
             <a:r>
               <a:rPr lang="pt-PT" dirty="0" err="1"/>
@@ -7797,7 +7797,7 @@
             <a:pPr lvl="1"/>
             <a:r>
               <a:rPr lang="pt-PT" dirty="0"/>
-              <a:t>Gap </a:t>
+              <a:t>Gap - </a:t>
             </a:r>
             <a:r>
               <a:rPr lang="pt-PT" dirty="0" err="1"/>
@@ -7820,7 +7820,7 @@
             <a:pPr lvl="1"/>
             <a:r>
               <a:rPr lang="pt-PT" dirty="0"/>
-              <a:t>Time </a:t>
+              <a:t>Time - </a:t>
             </a:r>
             <a:r>
               <a:rPr lang="pt-PT" dirty="0" err="1"/>
@@ -7857,7 +7857,7 @@
             <a:pPr lvl="1"/>
             <a:r>
               <a:rPr lang="pt-PT" dirty="0"/>
-              <a:t>Gap </a:t>
+              <a:t>Gap - </a:t>
             </a:r>
             <a:r>
               <a:rPr lang="pt-PT" dirty="0" err="1"/>
@@ -7880,7 +7880,7 @@
             <a:pPr lvl="1"/>
             <a:r>
               <a:rPr lang="pt-PT" dirty="0"/>
-              <a:t>Time </a:t>
+              <a:t>Time - </a:t>
             </a:r>
             <a:r>
               <a:rPr lang="pt-PT" dirty="0" err="1"/>
@@ -8028,7 +8028,7 @@
             <a:pPr lvl="1"/>
             <a:r>
               <a:rPr lang="pt-PT" dirty="0"/>
-              <a:t>Gap </a:t>
+              <a:t>Gap - </a:t>
             </a:r>
             <a:r>
               <a:rPr lang="pt-PT" dirty="0" err="1"/>
@@ -8051,7 +8051,7 @@
             <a:pPr lvl="1"/>
             <a:r>
               <a:rPr lang="pt-PT" dirty="0"/>
-              <a:t>Time </a:t>
+              <a:t>Time - </a:t>
             </a:r>
             <a:r>
               <a:rPr lang="pt-PT" dirty="0" err="1"/>
@@ -8084,7 +8084,7 @@
             <a:pPr lvl="1"/>
             <a:r>
               <a:rPr lang="pt-PT" dirty="0"/>
-              <a:t>Gap </a:t>
+              <a:t>Gap - </a:t>
             </a:r>
             <a:r>
               <a:rPr lang="pt-PT" dirty="0" err="1"/>
@@ -8107,7 +8107,7 @@
             <a:pPr lvl="1"/>
             <a:r>
               <a:rPr lang="pt-PT" dirty="0"/>
-              <a:t>Time </a:t>
+              <a:t>Time - </a:t>
             </a:r>
             <a:r>
               <a:rPr lang="pt-PT" dirty="0" err="1"/>
@@ -8160,7 +8160,7 @@
             <a:pPr lvl="1"/>
             <a:r>
               <a:rPr lang="pt-PT" dirty="0"/>
-              <a:t>Gap </a:t>
+              <a:t>Gap - </a:t>
             </a:r>
             <a:r>
               <a:rPr lang="pt-PT" dirty="0" err="1"/>
@@ -8183,7 +8183,7 @@
             <a:pPr lvl="1"/>
             <a:r>
               <a:rPr lang="pt-PT" dirty="0"/>
-              <a:t>Time </a:t>
+              <a:t>Time - </a:t>
             </a:r>
             <a:r>
               <a:rPr lang="pt-PT" dirty="0" err="1"/>
@@ -8220,7 +8220,7 @@
             <a:pPr lvl="1"/>
             <a:r>
               <a:rPr lang="pt-PT" dirty="0"/>
-              <a:t>Gap </a:t>
+              <a:t>Gap - </a:t>
             </a:r>
             <a:r>
               <a:rPr lang="pt-PT" dirty="0" err="1"/>
@@ -8243,7 +8243,7 @@
             <a:pPr lvl="1"/>
             <a:r>
               <a:rPr lang="pt-PT" dirty="0"/>
-              <a:t>Time </a:t>
+              <a:t>Time - </a:t>
             </a:r>
             <a:r>
               <a:rPr lang="pt-PT" dirty="0" err="1"/>
@@ -8280,7 +8280,7 @@
             <a:pPr lvl="1"/>
             <a:r>
               <a:rPr lang="pt-PT" dirty="0"/>
-              <a:t>Gap </a:t>
+              <a:t>Gap - </a:t>
             </a:r>
             <a:r>
               <a:rPr lang="pt-PT" dirty="0" err="1"/>
@@ -8303,7 +8303,7 @@
             <a:pPr lvl="1"/>
             <a:r>
               <a:rPr lang="pt-PT" dirty="0"/>
-              <a:t>Time </a:t>
+              <a:t>Time - </a:t>
             </a:r>
             <a:r>
               <a:rPr lang="pt-PT" dirty="0" err="1"/>
@@ -8456,7 +8456,7 @@
             <a:pPr lvl="1"/>
             <a:r>
               <a:rPr lang="pt-PT" dirty="0"/>
-              <a:t>Gap </a:t>
+              <a:t>Gap - </a:t>
             </a:r>
             <a:r>
               <a:rPr lang="pt-PT" dirty="0" err="1"/>
@@ -8479,7 +8479,7 @@
             <a:pPr lvl="1"/>
             <a:r>
               <a:rPr lang="pt-PT" dirty="0"/>
-              <a:t>Time </a:t>
+              <a:t>Time - </a:t>
             </a:r>
             <a:r>
               <a:rPr lang="pt-PT" dirty="0" err="1"/>
@@ -8512,7 +8512,7 @@
             <a:pPr lvl="1"/>
             <a:r>
               <a:rPr lang="pt-PT" dirty="0"/>
-              <a:t>Gap </a:t>
+              <a:t>Gap - </a:t>
             </a:r>
             <a:r>
               <a:rPr lang="pt-PT" dirty="0" err="1"/>
@@ -8535,7 +8535,7 @@
             <a:pPr lvl="1"/>
             <a:r>
               <a:rPr lang="pt-PT" dirty="0"/>
-              <a:t>Time </a:t>
+              <a:t>Time - </a:t>
             </a:r>
             <a:r>
               <a:rPr lang="pt-PT" dirty="0" err="1"/>
@@ -8588,7 +8588,7 @@
             <a:pPr lvl="1"/>
             <a:r>
               <a:rPr lang="pt-PT" dirty="0"/>
-              <a:t>Gap </a:t>
+              <a:t>Gap - </a:t>
             </a:r>
             <a:r>
               <a:rPr lang="pt-PT" dirty="0" err="1"/>
@@ -8611,7 +8611,7 @@
             <a:pPr lvl="1"/>
             <a:r>
               <a:rPr lang="pt-PT" dirty="0"/>
-              <a:t>Time </a:t>
+              <a:t>Time - </a:t>
             </a:r>
             <a:r>
               <a:rPr lang="pt-PT" dirty="0" err="1"/>
@@ -8648,7 +8648,7 @@
             <a:pPr lvl="1"/>
             <a:r>
               <a:rPr lang="pt-PT" dirty="0"/>
-              <a:t>Gap </a:t>
+              <a:t>Gap - </a:t>
             </a:r>
             <a:r>
               <a:rPr lang="pt-PT" dirty="0" err="1"/>
@@ -8671,7 +8671,7 @@
             <a:pPr lvl="1"/>
             <a:r>
               <a:rPr lang="pt-PT" dirty="0"/>
-              <a:t>Time </a:t>
+              <a:t>Time - </a:t>
             </a:r>
             <a:r>
               <a:rPr lang="pt-PT" dirty="0" err="1"/>
@@ -8708,7 +8708,7 @@
             <a:pPr lvl="1"/>
             <a:r>
               <a:rPr lang="pt-PT" dirty="0"/>
-              <a:t>Gap </a:t>
+              <a:t>Gap - </a:t>
             </a:r>
             <a:r>
               <a:rPr lang="pt-PT" dirty="0" err="1"/>
@@ -8731,7 +8731,7 @@
             <a:pPr lvl="1"/>
             <a:r>
               <a:rPr lang="pt-PT" dirty="0"/>
-              <a:t>Time </a:t>
+              <a:t>Time - </a:t>
             </a:r>
             <a:r>
               <a:rPr lang="pt-PT" dirty="0" err="1"/>
@@ -8879,7 +8879,7 @@
             <a:pPr lvl="1"/>
             <a:r>
               <a:rPr lang="pt-PT" dirty="0"/>
-              <a:t>Gap </a:t>
+              <a:t>Gap - </a:t>
             </a:r>
             <a:r>
               <a:rPr lang="pt-PT" dirty="0" err="1"/>
@@ -8902,7 +8902,7 @@
             <a:pPr lvl="1"/>
             <a:r>
               <a:rPr lang="pt-PT" dirty="0"/>
-              <a:t>Time </a:t>
+              <a:t>Time - </a:t>
             </a:r>
             <a:r>
               <a:rPr lang="pt-PT" dirty="0" err="1"/>
@@ -8935,7 +8935,7 @@
             <a:pPr lvl="1"/>
             <a:r>
               <a:rPr lang="pt-PT" dirty="0"/>
-              <a:t>Gap </a:t>
+              <a:t>Gap - </a:t>
             </a:r>
             <a:r>
               <a:rPr lang="pt-PT" dirty="0" err="1"/>
@@ -8958,7 +8958,7 @@
             <a:pPr lvl="1"/>
             <a:r>
               <a:rPr lang="pt-PT" dirty="0"/>
-              <a:t>Time </a:t>
+              <a:t>Time - </a:t>
             </a:r>
             <a:r>
               <a:rPr lang="pt-PT" dirty="0" err="1"/>
@@ -9011,7 +9011,7 @@
             <a:pPr lvl="1"/>
             <a:r>
               <a:rPr lang="pt-PT" dirty="0"/>
-              <a:t>Gap </a:t>
+              <a:t>Gap - </a:t>
             </a:r>
             <a:r>
               <a:rPr lang="pt-PT" dirty="0" err="1"/>
@@ -9034,7 +9034,7 @@
             <a:pPr lvl="1"/>
             <a:r>
               <a:rPr lang="pt-PT" dirty="0"/>
-              <a:t>Time </a:t>
+              <a:t>Time - </a:t>
             </a:r>
             <a:r>
               <a:rPr lang="pt-PT" dirty="0" err="1"/>
@@ -9071,7 +9071,7 @@
             <a:pPr lvl="1"/>
             <a:r>
               <a:rPr lang="pt-PT" dirty="0"/>
-              <a:t>Gap </a:t>
+              <a:t>Gap - </a:t>
             </a:r>
             <a:r>
               <a:rPr lang="pt-PT" dirty="0" err="1"/>
@@ -9094,7 +9094,7 @@
             <a:pPr lvl="1"/>
             <a:r>
               <a:rPr lang="pt-PT" dirty="0"/>
-              <a:t>Time </a:t>
+              <a:t>Time - </a:t>
             </a:r>
             <a:r>
               <a:rPr lang="pt-PT" dirty="0" err="1"/>
@@ -9131,7 +9131,7 @@
             <a:pPr lvl="1"/>
             <a:r>
               <a:rPr lang="pt-PT" dirty="0"/>
-              <a:t>Gap </a:t>
+              <a:t>Gap - </a:t>
             </a:r>
             <a:r>
               <a:rPr lang="pt-PT" dirty="0" err="1"/>
@@ -9154,7 +9154,7 @@
             <a:pPr lvl="1"/>
             <a:r>
               <a:rPr lang="pt-PT" dirty="0"/>
-              <a:t>Time </a:t>
+              <a:t>Time - </a:t>
             </a:r>
             <a:r>
               <a:rPr lang="pt-PT" dirty="0" err="1"/>
@@ -9304,7 +9304,7 @@
             <a:pPr lvl="1"/>
             <a:r>
               <a:rPr lang="pt-PT" dirty="0"/>
-              <a:t>Gap </a:t>
+              <a:t>Gap - </a:t>
             </a:r>
             <a:r>
               <a:rPr lang="pt-PT" dirty="0" err="1"/>
@@ -9327,7 +9327,7 @@
             <a:pPr lvl="1"/>
             <a:r>
               <a:rPr lang="pt-PT" dirty="0"/>
-              <a:t>Time </a:t>
+              <a:t>Time - </a:t>
             </a:r>
             <a:r>
               <a:rPr lang="pt-PT" dirty="0" err="1"/>
@@ -9360,7 +9360,7 @@
             <a:pPr lvl="1"/>
             <a:r>
               <a:rPr lang="pt-PT" dirty="0"/>
-              <a:t>Gap </a:t>
+              <a:t>Gap - </a:t>
             </a:r>
             <a:r>
               <a:rPr lang="pt-PT" dirty="0" err="1"/>
@@ -9383,7 +9383,7 @@
             <a:pPr lvl="1"/>
             <a:r>
               <a:rPr lang="pt-PT" dirty="0"/>
-              <a:t>Time </a:t>
+              <a:t>Time - </a:t>
             </a:r>
             <a:r>
               <a:rPr lang="pt-PT" dirty="0" err="1"/>
@@ -9436,7 +9436,7 @@
             <a:pPr lvl="1"/>
             <a:r>
               <a:rPr lang="pt-PT" dirty="0"/>
-              <a:t>Gap </a:t>
+              <a:t>Gap - </a:t>
             </a:r>
             <a:r>
               <a:rPr lang="pt-PT" dirty="0" err="1"/>
@@ -9459,7 +9459,7 @@
             <a:pPr lvl="1"/>
             <a:r>
               <a:rPr lang="pt-PT" dirty="0"/>
-              <a:t>Time </a:t>
+              <a:t>Time - </a:t>
             </a:r>
             <a:r>
               <a:rPr lang="pt-PT" dirty="0" err="1"/>
@@ -9496,7 +9496,7 @@
             <a:pPr lvl="1"/>
             <a:r>
               <a:rPr lang="pt-PT" dirty="0"/>
-              <a:t>Gap </a:t>
+              <a:t>Gap - </a:t>
             </a:r>
             <a:r>
               <a:rPr lang="pt-PT" dirty="0" err="1"/>
@@ -9519,7 +9519,7 @@
             <a:pPr lvl="1"/>
             <a:r>
               <a:rPr lang="pt-PT" dirty="0"/>
-              <a:t>Time </a:t>
+              <a:t>Time - </a:t>
             </a:r>
             <a:r>
               <a:rPr lang="pt-PT" dirty="0" err="1"/>
@@ -9556,7 +9556,7 @@
             <a:pPr lvl="1"/>
             <a:r>
               <a:rPr lang="pt-PT" dirty="0"/>
-              <a:t>Gap </a:t>
+              <a:t>Gap - </a:t>
             </a:r>
             <a:r>
               <a:rPr lang="pt-PT" dirty="0" err="1"/>
@@ -9579,7 +9579,7 @@
             <a:pPr lvl="1"/>
             <a:r>
               <a:rPr lang="pt-PT" dirty="0"/>
-              <a:t>Time </a:t>
+              <a:t>Time - </a:t>
             </a:r>
             <a:r>
               <a:rPr lang="pt-PT" dirty="0" err="1"/>

</xml_diff>